<commit_message>
update Vite 工程化实践.pptx and vite-engineering-practice project
</commit_message>
<xml_diff>
--- a/Vite2 项目工程化和原理剖析/Distributed Secheduling Service(DSS).pptx
+++ b/Vite2 项目工程化和原理剖析/Distributed Secheduling Service(DSS).pptx
@@ -225,7 +225,7 @@
           <a:p>
             <a:fld id="{43D3B5DC-5A44-4224-A378-A4AE18733366}" type="datetimeFigureOut">
               <a:rPr lang="zh-CN" altLang="en-US" smtClean="0"/>
-              <a:t>2020/11/9</a:t>
+              <a:t>2021/10/24</a:t>
             </a:fld>
             <a:endParaRPr lang="zh-CN" altLang="en-US"/>
           </a:p>
@@ -1425,7 +1425,7 @@
           <a:p>
             <a:fld id="{7B4ACD49-752C-6640-A7E1-86D496202B68}" type="datetimeFigureOut">
               <a:rPr lang="en-US" smtClean="0"/>
-              <a:t>11/9/2020</a:t>
+              <a:t>10/24/21</a:t>
             </a:fld>
             <a:endParaRPr lang="en-US"/>
           </a:p>
@@ -1857,7 +1857,7 @@
           <a:p>
             <a:fld id="{7B4ACD49-752C-6640-A7E1-86D496202B68}" type="datetimeFigureOut">
               <a:rPr lang="en-US" smtClean="0"/>
-              <a:t>11/9/2020</a:t>
+              <a:t>10/24/21</a:t>
             </a:fld>
             <a:endParaRPr lang="en-US"/>
           </a:p>
@@ -2055,7 +2055,7 @@
           <a:p>
             <a:fld id="{7B4ACD49-752C-6640-A7E1-86D496202B68}" type="datetimeFigureOut">
               <a:rPr lang="en-US" smtClean="0"/>
-              <a:t>11/9/2020</a:t>
+              <a:t>10/24/21</a:t>
             </a:fld>
             <a:endParaRPr lang="en-US"/>
           </a:p>
@@ -2263,7 +2263,7 @@
           <a:p>
             <a:fld id="{7B4ACD49-752C-6640-A7E1-86D496202B68}" type="datetimeFigureOut">
               <a:rPr lang="en-US" smtClean="0"/>
-              <a:t>11/9/2020</a:t>
+              <a:t>10/24/21</a:t>
             </a:fld>
             <a:endParaRPr lang="en-US"/>
           </a:p>
@@ -2461,7 +2461,7 @@
           <a:p>
             <a:fld id="{7B4ACD49-752C-6640-A7E1-86D496202B68}" type="datetimeFigureOut">
               <a:rPr lang="en-US" smtClean="0"/>
-              <a:t>11/9/2020</a:t>
+              <a:t>10/24/21</a:t>
             </a:fld>
             <a:endParaRPr lang="en-US"/>
           </a:p>
@@ -2838,7 +2838,7 @@
           <a:p>
             <a:fld id="{7B4ACD49-752C-6640-A7E1-86D496202B68}" type="datetimeFigureOut">
               <a:rPr lang="en-US" smtClean="0"/>
-              <a:t>11/9/2020</a:t>
+              <a:t>10/24/21</a:t>
             </a:fld>
             <a:endParaRPr lang="en-US"/>
           </a:p>
@@ -3291,7 +3291,7 @@
           <a:p>
             <a:fld id="{7B4ACD49-752C-6640-A7E1-86D496202B68}" type="datetimeFigureOut">
               <a:rPr lang="en-US" smtClean="0"/>
-              <a:t>11/9/2020</a:t>
+              <a:t>10/24/21</a:t>
             </a:fld>
             <a:endParaRPr lang="en-US"/>
           </a:p>
@@ -3700,7 +3700,7 @@
           <a:p>
             <a:fld id="{7B4ACD49-752C-6640-A7E1-86D496202B68}" type="datetimeFigureOut">
               <a:rPr lang="en-US" smtClean="0"/>
-              <a:t>11/9/2020</a:t>
+              <a:t>10/24/21</a:t>
             </a:fld>
             <a:endParaRPr lang="en-US"/>
           </a:p>
@@ -4112,7 +4112,7 @@
           <a:p>
             <a:fld id="{7B4ACD49-752C-6640-A7E1-86D496202B68}" type="datetimeFigureOut">
               <a:rPr lang="en-US" smtClean="0"/>
-              <a:t>11/9/2020</a:t>
+              <a:t>10/24/21</a:t>
             </a:fld>
             <a:endParaRPr lang="en-US"/>
           </a:p>
@@ -4253,7 +4253,7 @@
           <a:p>
             <a:fld id="{7B4ACD49-752C-6640-A7E1-86D496202B68}" type="datetimeFigureOut">
               <a:rPr lang="en-US" smtClean="0"/>
-              <a:t>11/9/2020</a:t>
+              <a:t>10/24/21</a:t>
             </a:fld>
             <a:endParaRPr lang="en-US"/>
           </a:p>
@@ -4366,7 +4366,7 @@
           <a:p>
             <a:fld id="{7B4ACD49-752C-6640-A7E1-86D496202B68}" type="datetimeFigureOut">
               <a:rPr lang="en-US" smtClean="0"/>
-              <a:t>11/9/2020</a:t>
+              <a:t>10/24/21</a:t>
             </a:fld>
             <a:endParaRPr lang="en-US"/>
           </a:p>
@@ -4677,7 +4677,7 @@
           <a:p>
             <a:fld id="{7B4ACD49-752C-6640-A7E1-86D496202B68}" type="datetimeFigureOut">
               <a:rPr lang="en-US" smtClean="0"/>
-              <a:t>11/9/2020</a:t>
+              <a:t>10/24/21</a:t>
             </a:fld>
             <a:endParaRPr lang="en-US"/>
           </a:p>
@@ -4918,7 +4918,7 @@
           <a:p>
             <a:fld id="{7B4ACD49-752C-6640-A7E1-86D496202B68}" type="datetimeFigureOut">
               <a:rPr lang="en-US" smtClean="0"/>
-              <a:t>11/9/2020</a:t>
+              <a:t>10/24/21</a:t>
             </a:fld>
             <a:endParaRPr lang="en-US"/>
           </a:p>

</xml_diff>